<commit_message>
slides-118-BRSKI-AE.pptx: adapted layout on 2nd slide
</commit_message>
<xml_diff>
--- a/presentations/slides-119-BRSKI-AE.pptx
+++ b/presentations/slides-119-BRSKI-AE.pptx
@@ -2561,7 +2561,7 @@
               <a:buChar char="•"/>
             </a:pPr>
             <a:r>
-              <a:rPr lang="en-GB" sz="2200" spc="-1" dirty="0">
+              <a:rPr lang="en-GB" sz="2000" spc="-1" dirty="0">
                 <a:solidFill>
                   <a:schemeClr val="tx1">
                     <a:lumMod val="50000"/>
@@ -2574,7 +2574,7 @@
               <a:t>SECDIR Last Call Review completed </a:t>
             </a:r>
             <a:r>
-              <a:rPr lang="en-US" sz="2200" spc="-1" dirty="0">
+              <a:rPr lang="en-US" sz="2000" spc="-1" dirty="0">
                 <a:solidFill>
                   <a:schemeClr val="tx1">
                     <a:lumMod val="50000"/>
@@ -2587,7 +2587,7 @@
               <a:t>by Barry Leiba </a:t>
             </a:r>
             <a:r>
-              <a:rPr lang="en-GB" sz="2200" spc="-1" dirty="0">
+              <a:rPr lang="en-GB" sz="2000" spc="-1" dirty="0">
                 <a:solidFill>
                   <a:schemeClr val="tx1">
                     <a:lumMod val="50000"/>
@@ -2600,7 +2600,7 @@
               <a:t>on Nov 4</a:t>
             </a:r>
             <a:r>
-              <a:rPr lang="en-GB" sz="2200" spc="-1" baseline="30000" dirty="0">
+              <a:rPr lang="en-GB" sz="2000" spc="-1" baseline="30000" dirty="0">
                 <a:solidFill>
                   <a:schemeClr val="tx1">
                     <a:lumMod val="50000"/>
@@ -2613,7 +2613,7 @@
               <a:t>th</a:t>
             </a:r>
             <a:r>
-              <a:rPr lang="en-GB" sz="2200" spc="-1" dirty="0">
+              <a:rPr lang="en-GB" sz="2000" spc="-1" dirty="0">
                 <a:solidFill>
                   <a:schemeClr val="tx1">
                     <a:lumMod val="50000"/>
@@ -2626,7 +2626,7 @@
               <a:t>; status: </a:t>
             </a:r>
             <a:r>
-              <a:rPr lang="en-GB" sz="2200" b="1" spc="-1" dirty="0">
+              <a:rPr lang="en-GB" sz="2000" b="1" spc="-1" dirty="0">
                 <a:solidFill>
                   <a:schemeClr val="tx1">
                     <a:lumMod val="50000"/>
@@ -2651,7 +2651,7 @@
               <a:buChar char="•"/>
             </a:pPr>
             <a:r>
-              <a:rPr lang="en-US" sz="2200" spc="-1" dirty="0">
+              <a:rPr lang="en-US" sz="2000" spc="-1" dirty="0">
                 <a:solidFill>
                   <a:schemeClr val="tx1">
                     <a:lumMod val="50000"/>
@@ -2676,7 +2676,7 @@
               </a:tabLst>
             </a:pPr>
             <a:r>
-              <a:rPr lang="en-US" sz="2200" spc="-1" dirty="0">
+              <a:rPr lang="en-US" sz="2000" spc="-1" dirty="0">
                 <a:solidFill>
                   <a:schemeClr val="tx1">
                     <a:lumMod val="50000"/>
@@ -2689,7 +2689,7 @@
               <a:t>Accepted as general problem </a:t>
             </a:r>
             <a:r>
-              <a:rPr lang="en-US" sz="2200" spc="-1" dirty="0">
+              <a:rPr lang="en-US" sz="2000" spc="-1" dirty="0">
                 <a:solidFill>
                   <a:schemeClr val="tx1">
                     <a:lumMod val="50000"/>
@@ -2703,7 +2703,7 @@
               <a:t> general solution </a:t>
             </a:r>
             <a:r>
-              <a:rPr lang="en-US" sz="2200" spc="-1" dirty="0">
+              <a:rPr lang="en-US" sz="2000" spc="-1" dirty="0">
                 <a:solidFill>
                   <a:schemeClr val="tx1">
                     <a:lumMod val="50000"/>
@@ -2716,7 +2716,7 @@
               <a:t>addressed in new draft: [</a:t>
             </a:r>
             <a:r>
-              <a:rPr lang="en-US" sz="2200" spc="-1" dirty="0">
+              <a:rPr lang="en-US" sz="2000" spc="-1" dirty="0">
                 <a:solidFill>
                   <a:schemeClr val="tx1">
                     <a:lumMod val="50000"/>
@@ -2736,7 +2736,7 @@
               <a:t>BRSKI-Discovery</a:t>
             </a:r>
             <a:r>
-              <a:rPr lang="en-US" sz="2200" spc="-1" dirty="0">
+              <a:rPr lang="en-US" sz="2000" spc="-1" dirty="0">
                 <a:solidFill>
                   <a:schemeClr val="tx1">
                     <a:lumMod val="50000"/>
@@ -2761,7 +2761,7 @@
               </a:tabLst>
             </a:pPr>
             <a:r>
-              <a:rPr lang="en-US" sz="2200" spc="-1" dirty="0">
+              <a:rPr lang="en-US" sz="2000" spc="-1" dirty="0">
                 <a:solidFill>
                   <a:schemeClr val="tx1">
                     <a:lumMod val="50000"/>
@@ -2774,7 +2774,7 @@
               <a:t>Absence of general solution handled in BRSKI-AE by specific service name ”</a:t>
             </a:r>
             <a:r>
-              <a:rPr lang="en-US" sz="2200" spc="-1" dirty="0" err="1">
+              <a:rPr lang="en-US" sz="2000" spc="-1" dirty="0" err="1">
                 <a:solidFill>
                   <a:schemeClr val="tx1">
                     <a:lumMod val="50000"/>
@@ -2787,7 +2787,7 @@
               <a:t>brski</a:t>
             </a:r>
             <a:r>
-              <a:rPr lang="en-US" sz="2200" spc="-1" dirty="0">
+              <a:rPr lang="en-US" sz="2000" spc="-1" dirty="0">
                 <a:solidFill>
                   <a:schemeClr val="tx1">
                     <a:lumMod val="50000"/>
@@ -2800,7 +2800,7 @@
               <a:t>-registrar-</a:t>
             </a:r>
             <a:r>
-              <a:rPr lang="en-US" sz="2200" spc="-1" dirty="0" err="1">
+              <a:rPr lang="en-US" sz="2000" spc="-1" dirty="0" err="1">
                 <a:solidFill>
                   <a:schemeClr val="tx1">
                     <a:lumMod val="50000"/>
@@ -2813,7 +2813,7 @@
               <a:t>cmp</a:t>
             </a:r>
             <a:r>
-              <a:rPr lang="en-US" sz="2200" spc="-1" dirty="0">
+              <a:rPr lang="en-US" sz="2000" spc="-1" dirty="0">
                 <a:solidFill>
                   <a:schemeClr val="tx1">
                     <a:lumMod val="50000"/>
@@ -8669,12 +8669,16 @@
 </file>
 
 <file path=customXml/item1.xml><?xml version="1.0" encoding="utf-8"?>
-<?mso-contentType ?>
-<FormTemplates xmlns="http://schemas.microsoft.com/sharepoint/v3/contenttype/forms">
-  <Display>DocumentLibraryForm</Display>
-  <Edit>DocumentLibraryForm</Edit>
-  <New>DocumentLibraryForm</New>
-</FormTemplates>
+<p:properties xmlns:p="http://schemas.microsoft.com/office/2006/metadata/properties" xmlns:xsi="http://www.w3.org/2001/XMLSchema-instance" xmlns:pc="http://schemas.microsoft.com/office/infopath/2007/PartnerControls">
+  <documentManagement>
+    <_ip_UnifiedCompliancePolicyUIAction xmlns="http://schemas.microsoft.com/sharepoint/v3" xsi:nil="true"/>
+    <TaxCatchAll xmlns="56810815-8df0-4f10-8da7-34164765fbe3" xsi:nil="true"/>
+    <_ip_UnifiedCompliancePolicyProperties xmlns="http://schemas.microsoft.com/sharepoint/v3" xsi:nil="true"/>
+    <lcf76f155ced4ddcb4097134ff3c332f xmlns="a9de424c-86b2-47ed-8d4e-0a9b7010e669">
+      <Terms xmlns="http://schemas.microsoft.com/office/infopath/2007/PartnerControls"/>
+    </lcf76f155ced4ddcb4097134ff3c332f>
+  </documentManagement>
+</p:properties>
 </file>
 
 <file path=customXml/item2.xml><?xml version="1.0" encoding="utf-8"?>
@@ -8943,22 +8947,29 @@
 </file>
 
 <file path=customXml/item3.xml><?xml version="1.0" encoding="utf-8"?>
-<p:properties xmlns:p="http://schemas.microsoft.com/office/2006/metadata/properties" xmlns:xsi="http://www.w3.org/2001/XMLSchema-instance" xmlns:pc="http://schemas.microsoft.com/office/infopath/2007/PartnerControls">
-  <documentManagement>
-    <_ip_UnifiedCompliancePolicyUIAction xmlns="http://schemas.microsoft.com/sharepoint/v3" xsi:nil="true"/>
-    <TaxCatchAll xmlns="56810815-8df0-4f10-8da7-34164765fbe3" xsi:nil="true"/>
-    <_ip_UnifiedCompliancePolicyProperties xmlns="http://schemas.microsoft.com/sharepoint/v3" xsi:nil="true"/>
-    <lcf76f155ced4ddcb4097134ff3c332f xmlns="a9de424c-86b2-47ed-8d4e-0a9b7010e669">
-      <Terms xmlns="http://schemas.microsoft.com/office/infopath/2007/PartnerControls"/>
-    </lcf76f155ced4ddcb4097134ff3c332f>
-  </documentManagement>
-</p:properties>
+<?mso-contentType ?>
+<FormTemplates xmlns="http://schemas.microsoft.com/sharepoint/v3/contenttype/forms">
+  <Display>DocumentLibraryForm</Display>
+  <Edit>DocumentLibraryForm</Edit>
+  <New>DocumentLibraryForm</New>
+</FormTemplates>
 </file>
 
 <file path=customXml/itemProps1.xml><?xml version="1.0" encoding="utf-8"?>
-<ds:datastoreItem xmlns:ds="http://schemas.openxmlformats.org/officeDocument/2006/customXml" ds:itemID="{5C6BD9E7-C020-4AD1-A7ED-9C09B3AA4FEA}">
+<ds:datastoreItem xmlns:ds="http://schemas.openxmlformats.org/officeDocument/2006/customXml" ds:itemID="{C176CB81-6753-41D9-B160-D542CFFB89BA}">
   <ds:schemaRefs>
-    <ds:schemaRef ds:uri="http://schemas.microsoft.com/sharepoint/v3/contenttype/forms"/>
+    <ds:schemaRef ds:uri="a9de424c-86b2-47ed-8d4e-0a9b7010e669"/>
+    <ds:schemaRef ds:uri="ce079751-a51b-4a27-9376-edf93eae18d5"/>
+    <ds:schemaRef ds:uri="http://purl.org/dc/terms/"/>
+    <ds:schemaRef ds:uri="http://schemas.microsoft.com/office/2006/documentManagement/types"/>
+    <ds:schemaRef ds:uri="http://schemas.microsoft.com/office/infopath/2007/PartnerControls"/>
+    <ds:schemaRef ds:uri="http://schemas.openxmlformats.org/package/2006/metadata/core-properties"/>
+    <ds:schemaRef ds:uri="http://purl.org/dc/elements/1.1/"/>
+    <ds:schemaRef ds:uri="http://schemas.microsoft.com/office/2006/metadata/properties"/>
+    <ds:schemaRef ds:uri="http://schemas.microsoft.com/sharepoint/v3"/>
+    <ds:schemaRef ds:uri="56810815-8df0-4f10-8da7-34164765fbe3"/>
+    <ds:schemaRef ds:uri="http://www.w3.org/XML/1998/namespace"/>
+    <ds:schemaRef ds:uri="http://purl.org/dc/dcmitype/"/>
   </ds:schemaRefs>
 </ds:datastoreItem>
 </file>
@@ -8985,20 +8996,9 @@
 </file>
 
 <file path=customXml/itemProps3.xml><?xml version="1.0" encoding="utf-8"?>
-<ds:datastoreItem xmlns:ds="http://schemas.openxmlformats.org/officeDocument/2006/customXml" ds:itemID="{C176CB81-6753-41D9-B160-D542CFFB89BA}">
+<ds:datastoreItem xmlns:ds="http://schemas.openxmlformats.org/officeDocument/2006/customXml" ds:itemID="{5C6BD9E7-C020-4AD1-A7ED-9C09B3AA4FEA}">
   <ds:schemaRefs>
-    <ds:schemaRef ds:uri="a9de424c-86b2-47ed-8d4e-0a9b7010e669"/>
-    <ds:schemaRef ds:uri="ce079751-a51b-4a27-9376-edf93eae18d5"/>
-    <ds:schemaRef ds:uri="http://purl.org/dc/terms/"/>
-    <ds:schemaRef ds:uri="http://schemas.microsoft.com/office/2006/documentManagement/types"/>
-    <ds:schemaRef ds:uri="http://schemas.microsoft.com/office/infopath/2007/PartnerControls"/>
-    <ds:schemaRef ds:uri="http://schemas.openxmlformats.org/package/2006/metadata/core-properties"/>
-    <ds:schemaRef ds:uri="http://purl.org/dc/elements/1.1/"/>
-    <ds:schemaRef ds:uri="http://schemas.microsoft.com/office/2006/metadata/properties"/>
-    <ds:schemaRef ds:uri="http://schemas.microsoft.com/sharepoint/v3"/>
-    <ds:schemaRef ds:uri="56810815-8df0-4f10-8da7-34164765fbe3"/>
-    <ds:schemaRef ds:uri="http://www.w3.org/XML/1998/namespace"/>
-    <ds:schemaRef ds:uri="http://purl.org/dc/dcmitype/"/>
+    <ds:schemaRef ds:uri="http://schemas.microsoft.com/sharepoint/v3/contenttype/forms"/>
   </ds:schemaRefs>
 </ds:datastoreItem>
 </file>

</xml_diff>